<commit_message>
Correntto alcune slide della presentazione
</commit_message>
<xml_diff>
--- a/presentazione/presentazione.pptx
+++ b/presentazione/presentazione.pptx
@@ -491,7 +491,7 @@
           <a:p>
             <a:fld id="{A8224893-DBDA-4BFA-9CE1-4BFE7CD0F8CF}" type="datetime1">
               <a:rPr lang="en-US" smtClean="0"/>
-              <a:t>9/9/2018</a:t>
+              <a:t>9/11/2018</a:t>
             </a:fld>
             <a:endParaRPr lang="en-US"/>
           </a:p>
@@ -661,7 +661,7 @@
           <a:p>
             <a:fld id="{5F4E5243-F52A-4D37-9694-EB26C6C31910}" type="datetime1">
               <a:rPr lang="en-US" smtClean="0"/>
-              <a:t>9/9/2018</a:t>
+              <a:t>9/11/2018</a:t>
             </a:fld>
             <a:endParaRPr lang="en-US"/>
           </a:p>
@@ -841,7 +841,7 @@
           <a:p>
             <a:fld id="{3A77B6E1-634A-48DC-9E8B-D894023267EF}" type="datetime1">
               <a:rPr lang="en-US" smtClean="0"/>
-              <a:t>9/9/2018</a:t>
+              <a:t>9/11/2018</a:t>
             </a:fld>
             <a:endParaRPr lang="en-US"/>
           </a:p>
@@ -1011,7 +1011,7 @@
           <a:p>
             <a:fld id="{7B2D3E9E-A95C-48F2-B4BF-A71542E0BE9A}" type="datetime1">
               <a:rPr lang="en-US" smtClean="0"/>
-              <a:t>9/9/2018</a:t>
+              <a:t>9/11/2018</a:t>
             </a:fld>
             <a:endParaRPr lang="en-US"/>
           </a:p>
@@ -1262,7 +1262,7 @@
           <a:p>
             <a:fld id="{A50F84E2-2D7A-43CF-AC90-352A289A783A}" type="datetime1">
               <a:rPr lang="en-US" smtClean="0"/>
-              <a:t>9/9/2018</a:t>
+              <a:t>9/11/2018</a:t>
             </a:fld>
             <a:endParaRPr lang="en-US"/>
           </a:p>
@@ -1494,7 +1494,7 @@
           <a:p>
             <a:fld id="{F12952B5-7A2F-4CC8-B7CE-9234E21C2837}" type="datetime1">
               <a:rPr lang="en-US" smtClean="0"/>
-              <a:t>9/9/2018</a:t>
+              <a:t>9/11/2018</a:t>
             </a:fld>
             <a:endParaRPr lang="en-US"/>
           </a:p>
@@ -1841,7 +1841,7 @@
           <a:p>
             <a:fld id="{CE1DA07A-9201-4B4B-BAF2-015AFA30F520}" type="datetime1">
               <a:rPr lang="en-US" smtClean="0"/>
-              <a:t>9/9/2018</a:t>
+              <a:t>9/11/2018</a:t>
             </a:fld>
             <a:endParaRPr lang="en-US"/>
           </a:p>
@@ -1959,7 +1959,7 @@
           <a:p>
             <a:fld id="{73D7E00A-486F-4252-8B1D-E32645521F49}" type="datetime1">
               <a:rPr lang="en-US" smtClean="0"/>
-              <a:t>9/9/2018</a:t>
+              <a:t>9/11/2018</a:t>
             </a:fld>
             <a:endParaRPr lang="en-US"/>
           </a:p>
@@ -2077,7 +2077,7 @@
           <a:p>
             <a:fld id="{8DDF5F92-E675-4B36-9A60-69A962A68675}" type="datetime1">
               <a:rPr lang="en-US" smtClean="0"/>
-              <a:t>9/9/2018</a:t>
+              <a:t>9/11/2018</a:t>
             </a:fld>
             <a:endParaRPr lang="en-US"/>
           </a:p>
@@ -2361,7 +2361,7 @@
           <a:p>
             <a:fld id="{AF6E2C9B-5FA2-460D-9BE7-B0812FC2A6FF}" type="datetime1">
               <a:rPr lang="en-US" smtClean="0"/>
-              <a:t>9/9/2018</a:t>
+              <a:t>9/11/2018</a:t>
             </a:fld>
             <a:endParaRPr lang="en-US"/>
           </a:p>
@@ -2625,7 +2625,7 @@
           <a:p>
             <a:fld id="{1D374940-A916-4C8B-9648-02A2D3898F9E}" type="datetime1">
               <a:rPr lang="en-US" smtClean="0"/>
-              <a:t>9/9/2018</a:t>
+              <a:t>9/11/2018</a:t>
             </a:fld>
             <a:endParaRPr lang="en-US"/>
           </a:p>
@@ -2839,7 +2839,7 @@
           <a:p>
             <a:fld id="{5586B75A-687E-405C-8A0B-8D00578BA2C3}" type="datetime1">
               <a:rPr lang="en-US" smtClean="0"/>
-              <a:t>9/9/2018</a:t>
+              <a:t>9/11/2018</a:t>
             </a:fld>
             <a:endParaRPr lang="en-US"/>
           </a:p>
@@ -3664,7 +3664,7 @@
 </file>
 
 <file path=ppt/slides/slide10.xml><?xml version="1.0" encoding="utf-8"?>
-<p:sld xmlns:a="http://schemas.openxmlformats.org/drawingml/2006/main" xmlns:r="http://schemas.openxmlformats.org/officeDocument/2006/relationships" xmlns:p="http://schemas.openxmlformats.org/presentationml/2006/main">
+<p:sld xmlns:a="http://schemas.openxmlformats.org/drawingml/2006/main" xmlns:r="http://schemas.openxmlformats.org/officeDocument/2006/relationships" xmlns:p="http://schemas.openxmlformats.org/presentationml/2006/main" show="0">
   <p:cSld>
     <p:spTree>
       <p:nvGrpSpPr>
@@ -6670,10 +6670,10 @@
       </p:sp>
       <p:pic>
         <p:nvPicPr>
-          <p:cNvPr id="15" name="Immagine 14" descr="Immagine che contiene testo&#10;&#10;Descrizione generata con affidabilità molto elevata">
+          <p:cNvPr id="20" name="Immagine 19" descr="Immagine che contiene oggetto, orologio&#10;&#10;Descrizione generata con affidabilità molto elevata">
             <a:extLst>
               <a:ext uri="{FF2B5EF4-FFF2-40B4-BE49-F238E27FC236}">
-                <a16:creationId xmlns:a16="http://schemas.microsoft.com/office/drawing/2014/main" id="{2E7D7DEC-17C2-4B55-A5FB-90B7DFEFEFE4}"/>
+                <a16:creationId xmlns:a16="http://schemas.microsoft.com/office/drawing/2014/main" id="{0E376F24-DBCB-452C-8D01-11B4838BBE65}"/>
               </a:ext>
             </a:extLst>
           </p:cNvPr>
@@ -6696,8 +6696,8 @@
         </p:blipFill>
         <p:spPr>
           <a:xfrm>
-            <a:off x="6765186" y="800101"/>
-            <a:ext cx="4494094" cy="2549402"/>
+            <a:off x="5378074" y="3508498"/>
+            <a:ext cx="5905867" cy="1624276"/>
           </a:xfrm>
           <a:prstGeom prst="rect">
             <a:avLst/>
@@ -6706,10 +6706,10 @@
       </p:pic>
       <p:pic>
         <p:nvPicPr>
-          <p:cNvPr id="17" name="Immagine 16">
+          <p:cNvPr id="22" name="Immagine 21" descr="Immagine che contiene oggetto, orologio&#10;&#10;Descrizione generata con affidabilità elevata">
             <a:extLst>
               <a:ext uri="{FF2B5EF4-FFF2-40B4-BE49-F238E27FC236}">
-                <a16:creationId xmlns:a16="http://schemas.microsoft.com/office/drawing/2014/main" id="{D1B8683C-CE34-4516-B9B7-EDD49D7B7CE4}"/>
+                <a16:creationId xmlns:a16="http://schemas.microsoft.com/office/drawing/2014/main" id="{01174495-82A3-46A5-BE50-6C1B1712816E}"/>
               </a:ext>
             </a:extLst>
           </p:cNvPr>
@@ -6719,79 +6719,7 @@
           <p:nvPr/>
         </p:nvPicPr>
         <p:blipFill>
-          <a:blip r:embed="rId3" cstate="print">
-            <a:extLst>
-              <a:ext uri="{28A0092B-C50C-407E-A947-70E740481C1C}">
-                <a14:useLocalDpi xmlns:a14="http://schemas.microsoft.com/office/drawing/2010/main" val="0"/>
-              </a:ext>
-            </a:extLst>
-          </a:blip>
-          <a:stretch>
-            <a:fillRect/>
-          </a:stretch>
-        </p:blipFill>
-        <p:spPr>
-          <a:xfrm>
-            <a:off x="1069657" y="3751093"/>
-            <a:ext cx="2400373" cy="2400373"/>
-          </a:xfrm>
-          <a:prstGeom prst="rect">
-            <a:avLst/>
-          </a:prstGeom>
-        </p:spPr>
-      </p:pic>
-      <p:pic>
-        <p:nvPicPr>
-          <p:cNvPr id="20" name="Immagine 19" descr="Immagine che contiene oggetto, orologio&#10;&#10;Descrizione generata con affidabilità molto elevata">
-            <a:extLst>
-              <a:ext uri="{FF2B5EF4-FFF2-40B4-BE49-F238E27FC236}">
-                <a16:creationId xmlns:a16="http://schemas.microsoft.com/office/drawing/2014/main" id="{0E376F24-DBCB-452C-8D01-11B4838BBE65}"/>
-              </a:ext>
-            </a:extLst>
-          </p:cNvPr>
-          <p:cNvPicPr>
-            <a:picLocks noChangeAspect="1"/>
-          </p:cNvPicPr>
-          <p:nvPr/>
-        </p:nvPicPr>
-        <p:blipFill>
-          <a:blip r:embed="rId4">
-            <a:extLst>
-              <a:ext uri="{28A0092B-C50C-407E-A947-70E740481C1C}">
-                <a14:useLocalDpi xmlns:a14="http://schemas.microsoft.com/office/drawing/2010/main" val="0"/>
-              </a:ext>
-            </a:extLst>
-          </a:blip>
-          <a:stretch>
-            <a:fillRect/>
-          </a:stretch>
-        </p:blipFill>
-        <p:spPr>
-          <a:xfrm>
-            <a:off x="5378074" y="3508498"/>
-            <a:ext cx="5905867" cy="1624276"/>
-          </a:xfrm>
-          <a:prstGeom prst="rect">
-            <a:avLst/>
-          </a:prstGeom>
-        </p:spPr>
-      </p:pic>
-      <p:pic>
-        <p:nvPicPr>
-          <p:cNvPr id="22" name="Immagine 21" descr="Immagine che contiene oggetto, orologio&#10;&#10;Descrizione generata con affidabilità elevata">
-            <a:extLst>
-              <a:ext uri="{FF2B5EF4-FFF2-40B4-BE49-F238E27FC236}">
-                <a16:creationId xmlns:a16="http://schemas.microsoft.com/office/drawing/2014/main" id="{01174495-82A3-46A5-BE50-6C1B1712816E}"/>
-              </a:ext>
-            </a:extLst>
-          </p:cNvPr>
-          <p:cNvPicPr>
-            <a:picLocks noChangeAspect="1"/>
-          </p:cNvPicPr>
-          <p:nvPr/>
-        </p:nvPicPr>
-        <p:blipFill>
-          <a:blip r:embed="rId5">
+          <a:blip r:embed="rId3">
             <a:extLst>
               <a:ext uri="{28A0092B-C50C-407E-A947-70E740481C1C}">
                 <a14:useLocalDpi xmlns:a14="http://schemas.microsoft.com/office/drawing/2010/main" val="0"/>
@@ -6992,7 +6920,7 @@
           <p:nvPr/>
         </p:nvPicPr>
         <p:blipFill>
-          <a:blip r:embed="rId6">
+          <a:blip r:embed="rId4" cstate="print">
             <a:extLst>
               <a:ext uri="{28A0092B-C50C-407E-A947-70E740481C1C}">
                 <a14:useLocalDpi xmlns:a14="http://schemas.microsoft.com/office/drawing/2010/main" val="0"/>
@@ -7005,14 +6933,867 @@
         </p:blipFill>
         <p:spPr>
           <a:xfrm>
-            <a:off x="534431" y="605534"/>
-            <a:ext cx="3484476" cy="2829275"/>
+            <a:off x="646528" y="3818160"/>
+            <a:ext cx="3005195" cy="2440115"/>
           </a:xfrm>
           <a:prstGeom prst="rect">
             <a:avLst/>
           </a:prstGeom>
         </p:spPr>
       </p:pic>
+      <p:grpSp>
+        <p:nvGrpSpPr>
+          <p:cNvPr id="2" name="Gruppo 1">
+            <a:extLst>
+              <a:ext uri="{FF2B5EF4-FFF2-40B4-BE49-F238E27FC236}">
+                <a16:creationId xmlns:a16="http://schemas.microsoft.com/office/drawing/2014/main" id="{18AA04A9-B6F5-48A7-BF50-85E58B8CBD7C}"/>
+              </a:ext>
+            </a:extLst>
+          </p:cNvPr>
+          <p:cNvGrpSpPr/>
+          <p:nvPr/>
+        </p:nvGrpSpPr>
+        <p:grpSpPr>
+          <a:xfrm>
+            <a:off x="6543233" y="669460"/>
+            <a:ext cx="4291463" cy="2409046"/>
+            <a:chOff x="7132318" y="1111970"/>
+            <a:chExt cx="4291463" cy="2409046"/>
+          </a:xfrm>
+        </p:grpSpPr>
+        <p:grpSp>
+          <p:nvGrpSpPr>
+            <p:cNvPr id="13" name="Gruppo 17">
+              <a:extLst>
+                <a:ext uri="{FF2B5EF4-FFF2-40B4-BE49-F238E27FC236}">
+                  <a16:creationId xmlns:a16="http://schemas.microsoft.com/office/drawing/2014/main" id="{A14D8490-AC03-4A5B-B55F-BE4F9D58F4F6}"/>
+                </a:ext>
+              </a:extLst>
+            </p:cNvPr>
+            <p:cNvGrpSpPr/>
+            <p:nvPr/>
+          </p:nvGrpSpPr>
+          <p:grpSpPr>
+            <a:xfrm>
+              <a:off x="7677615" y="1111970"/>
+              <a:ext cx="3531504" cy="2409046"/>
+              <a:chOff x="0" y="-3"/>
+              <a:chExt cx="3531503" cy="2409044"/>
+            </a:xfrm>
+          </p:grpSpPr>
+          <p:sp>
+            <p:nvSpPr>
+              <p:cNvPr id="14" name="Connettore 2 2">
+                <a:extLst>
+                  <a:ext uri="{FF2B5EF4-FFF2-40B4-BE49-F238E27FC236}">
+                    <a16:creationId xmlns:a16="http://schemas.microsoft.com/office/drawing/2014/main" id="{A11CC2DA-5881-46CA-8071-BCE6129F1309}"/>
+                  </a:ext>
+                </a:extLst>
+              </p:cNvPr>
+              <p:cNvSpPr/>
+              <p:nvPr/>
+            </p:nvSpPr>
+            <p:spPr>
+              <a:xfrm flipV="1">
+                <a:off x="352479" y="624988"/>
+                <a:ext cx="2" cy="1784054"/>
+              </a:xfrm>
+              <a:prstGeom prst="line">
+                <a:avLst/>
+              </a:prstGeom>
+              <a:noFill/>
+              <a:ln w="76200" cap="flat">
+                <a:solidFill>
+                  <a:srgbClr val="0070C0"/>
+                </a:solidFill>
+                <a:prstDash val="solid"/>
+                <a:miter lim="800000"/>
+                <a:tailEnd type="triangle" w="med" len="med"/>
+              </a:ln>
+              <a:effectLst/>
+            </p:spPr>
+            <p:txBody>
+              <a:bodyPr wrap="square" lIns="45718" tIns="45718" rIns="45718" bIns="45718" numCol="1" anchor="t">
+                <a:noAutofit/>
+              </a:bodyPr>
+              <a:lstStyle/>
+              <a:p>
+                <a:endParaRPr/>
+              </a:p>
+            </p:txBody>
+          </p:sp>
+          <p:grpSp>
+            <p:nvGrpSpPr>
+              <p:cNvPr id="16" name="Gruppo 30">
+                <a:extLst>
+                  <a:ext uri="{FF2B5EF4-FFF2-40B4-BE49-F238E27FC236}">
+                    <a16:creationId xmlns:a16="http://schemas.microsoft.com/office/drawing/2014/main" id="{00C812E0-DA56-4FCA-BA5B-E42DB93430D6}"/>
+                  </a:ext>
+                </a:extLst>
+              </p:cNvPr>
+              <p:cNvGrpSpPr/>
+              <p:nvPr/>
+            </p:nvGrpSpPr>
+            <p:grpSpPr>
+              <a:xfrm>
+                <a:off x="0" y="-4"/>
+                <a:ext cx="3531504" cy="738670"/>
+                <a:chOff x="0" y="-2"/>
+                <a:chExt cx="3531503" cy="738669"/>
+              </a:xfrm>
+            </p:grpSpPr>
+            <p:grpSp>
+              <p:nvGrpSpPr>
+                <p:cNvPr id="18" name="CasellaDiTesto 19">
+                  <a:extLst>
+                    <a:ext uri="{FF2B5EF4-FFF2-40B4-BE49-F238E27FC236}">
+                      <a16:creationId xmlns:a16="http://schemas.microsoft.com/office/drawing/2014/main" id="{388A56CC-F393-4453-9D20-5C0A5D9BDA20}"/>
+                    </a:ext>
+                  </a:extLst>
+                </p:cNvPr>
+                <p:cNvGrpSpPr/>
+                <p:nvPr/>
+              </p:nvGrpSpPr>
+              <p:grpSpPr>
+                <a:xfrm>
+                  <a:off x="-1" y="-3"/>
+                  <a:ext cx="753478" cy="738670"/>
+                  <a:chOff x="0" y="0"/>
+                  <a:chExt cx="753477" cy="738669"/>
+                </a:xfrm>
+              </p:grpSpPr>
+              <p:sp>
+                <p:nvSpPr>
+                  <p:cNvPr id="28" name="Rettangolo">
+                    <a:extLst>
+                      <a:ext uri="{FF2B5EF4-FFF2-40B4-BE49-F238E27FC236}">
+                        <a16:creationId xmlns:a16="http://schemas.microsoft.com/office/drawing/2014/main" id="{0C159E9A-9932-46C9-BC8B-BAAEE403257A}"/>
+                      </a:ext>
+                    </a:extLst>
+                  </p:cNvPr>
+                  <p:cNvSpPr/>
+                  <p:nvPr/>
+                </p:nvSpPr>
+                <p:spPr>
+                  <a:xfrm>
+                    <a:off x="-1" y="-1"/>
+                    <a:ext cx="753479" cy="738670"/>
+                  </a:xfrm>
+                  <a:prstGeom prst="rect">
+                    <a:avLst/>
+                  </a:prstGeom>
+                  <a:blipFill rotWithShape="1">
+                    <a:blip r:embed="rId5"/>
+                    <a:srcRect/>
+                    <a:stretch>
+                      <a:fillRect/>
+                    </a:stretch>
+                  </a:blipFill>
+                  <a:ln w="12700" cap="flat">
+                    <a:noFill/>
+                    <a:miter lim="400000"/>
+                  </a:ln>
+                  <a:effectLst/>
+                </p:spPr>
+                <p:txBody>
+                  <a:bodyPr wrap="square" lIns="45718" tIns="45718" rIns="45718" bIns="45718" numCol="1" anchor="t">
+                    <a:noAutofit/>
+                  </a:bodyPr>
+                  <a:lstStyle/>
+                  <a:p>
+                    <a:endParaRPr/>
+                  </a:p>
+                </p:txBody>
+              </p:sp>
+              <p:sp>
+                <p:nvSpPr>
+                  <p:cNvPr id="29" name="Testo">
+                    <a:extLst>
+                      <a:ext uri="{FF2B5EF4-FFF2-40B4-BE49-F238E27FC236}">
+                        <a16:creationId xmlns:a16="http://schemas.microsoft.com/office/drawing/2014/main" id="{F23EED54-9ADC-47AA-9051-7DAA39BE48DC}"/>
+                      </a:ext>
+                    </a:extLst>
+                  </p:cNvPr>
+                  <p:cNvSpPr txBox="1"/>
+                  <p:nvPr/>
+                </p:nvSpPr>
+                <p:spPr>
+                  <a:xfrm>
+                    <a:off x="-1" y="-1"/>
+                    <a:ext cx="753479" cy="358139"/>
+                  </a:xfrm>
+                  <a:prstGeom prst="rect">
+                    <a:avLst/>
+                  </a:prstGeom>
+                  <a:noFill/>
+                  <a:ln w="12700" cap="flat">
+                    <a:noFill/>
+                    <a:miter lim="400000"/>
+                  </a:ln>
+                  <a:effectLst/>
+                  <a:extLst>
+                    <a:ext uri="{C572A759-6A51-4108-AA02-DFA0A04FC94B}">
+                      <ma14:wrappingTextBoxFlag xmlns:ma14="http://schemas.microsoft.com/office/mac/drawingml/2011/main" xmlns="" val="1"/>
+                    </a:ext>
+                  </a:extLst>
+                </p:spPr>
+                <p:txBody>
+                  <a:bodyPr wrap="square" lIns="45718" tIns="45718" rIns="45718" bIns="45718" numCol="1" anchor="t">
+                    <a:spAutoFit/>
+                  </a:bodyPr>
+                  <a:lstStyle/>
+                  <a:p>
+                    <a:r>
+                      <a:t> </a:t>
+                    </a:r>
+                  </a:p>
+                </p:txBody>
+              </p:sp>
+            </p:grpSp>
+            <p:grpSp>
+              <p:nvGrpSpPr>
+                <p:cNvPr id="19" name="CasellaDiTesto 20">
+                  <a:extLst>
+                    <a:ext uri="{FF2B5EF4-FFF2-40B4-BE49-F238E27FC236}">
+                      <a16:creationId xmlns:a16="http://schemas.microsoft.com/office/drawing/2014/main" id="{432248F3-83DC-40D1-951A-61486092FEA0}"/>
+                    </a:ext>
+                  </a:extLst>
+                </p:cNvPr>
+                <p:cNvGrpSpPr/>
+                <p:nvPr/>
+              </p:nvGrpSpPr>
+              <p:grpSpPr>
+                <a:xfrm>
+                  <a:off x="2763790" y="-3"/>
+                  <a:ext cx="767714" cy="738670"/>
+                  <a:chOff x="0" y="0"/>
+                  <a:chExt cx="767712" cy="738669"/>
+                </a:xfrm>
+              </p:grpSpPr>
+              <p:sp>
+                <p:nvSpPr>
+                  <p:cNvPr id="21" name="Rettangolo">
+                    <a:extLst>
+                      <a:ext uri="{FF2B5EF4-FFF2-40B4-BE49-F238E27FC236}">
+                        <a16:creationId xmlns:a16="http://schemas.microsoft.com/office/drawing/2014/main" id="{E2569AD1-8C0F-4B0A-BF10-75549415F19A}"/>
+                      </a:ext>
+                    </a:extLst>
+                  </p:cNvPr>
+                  <p:cNvSpPr/>
+                  <p:nvPr/>
+                </p:nvSpPr>
+                <p:spPr>
+                  <a:xfrm>
+                    <a:off x="-1" y="-1"/>
+                    <a:ext cx="767713" cy="738670"/>
+                  </a:xfrm>
+                  <a:prstGeom prst="rect">
+                    <a:avLst/>
+                  </a:prstGeom>
+                  <a:blipFill rotWithShape="1">
+                    <a:blip r:embed="rId6"/>
+                    <a:srcRect/>
+                    <a:stretch>
+                      <a:fillRect/>
+                    </a:stretch>
+                  </a:blipFill>
+                  <a:ln w="12700" cap="flat">
+                    <a:noFill/>
+                    <a:miter lim="400000"/>
+                  </a:ln>
+                  <a:effectLst/>
+                </p:spPr>
+                <p:txBody>
+                  <a:bodyPr wrap="square" lIns="45718" tIns="45718" rIns="45718" bIns="45718" numCol="1" anchor="t">
+                    <a:noAutofit/>
+                  </a:bodyPr>
+                  <a:lstStyle/>
+                  <a:p>
+                    <a:endParaRPr/>
+                  </a:p>
+                </p:txBody>
+              </p:sp>
+              <p:sp>
+                <p:nvSpPr>
+                  <p:cNvPr id="26" name="Testo">
+                    <a:extLst>
+                      <a:ext uri="{FF2B5EF4-FFF2-40B4-BE49-F238E27FC236}">
+                        <a16:creationId xmlns:a16="http://schemas.microsoft.com/office/drawing/2014/main" id="{1D4BBF05-0334-4B12-8823-69630A4ABA3A}"/>
+                      </a:ext>
+                    </a:extLst>
+                  </p:cNvPr>
+                  <p:cNvSpPr txBox="1"/>
+                  <p:nvPr/>
+                </p:nvSpPr>
+                <p:spPr>
+                  <a:xfrm>
+                    <a:off x="-1" y="-1"/>
+                    <a:ext cx="767713" cy="358139"/>
+                  </a:xfrm>
+                  <a:prstGeom prst="rect">
+                    <a:avLst/>
+                  </a:prstGeom>
+                  <a:noFill/>
+                  <a:ln w="12700" cap="flat">
+                    <a:noFill/>
+                    <a:miter lim="400000"/>
+                  </a:ln>
+                  <a:effectLst/>
+                  <a:extLst>
+                    <a:ext uri="{C572A759-6A51-4108-AA02-DFA0A04FC94B}">
+                      <ma14:wrappingTextBoxFlag xmlns:ma14="http://schemas.microsoft.com/office/mac/drawingml/2011/main" xmlns="" val="1"/>
+                    </a:ext>
+                  </a:extLst>
+                </p:spPr>
+                <p:txBody>
+                  <a:bodyPr wrap="square" lIns="45718" tIns="45718" rIns="45718" bIns="45718" numCol="1" anchor="t">
+                    <a:spAutoFit/>
+                  </a:bodyPr>
+                  <a:lstStyle/>
+                  <a:p>
+                    <a:r>
+                      <a:t> </a:t>
+                    </a:r>
+                  </a:p>
+                </p:txBody>
+              </p:sp>
+            </p:grpSp>
+          </p:grpSp>
+        </p:grpSp>
+        <p:grpSp>
+          <p:nvGrpSpPr>
+            <p:cNvPr id="30" name="Gruppo 29">
+              <a:extLst>
+                <a:ext uri="{FF2B5EF4-FFF2-40B4-BE49-F238E27FC236}">
+                  <a16:creationId xmlns:a16="http://schemas.microsoft.com/office/drawing/2014/main" id="{0FE80718-A418-485F-8548-545E589ED780}"/>
+                </a:ext>
+              </a:extLst>
+            </p:cNvPr>
+            <p:cNvGrpSpPr/>
+            <p:nvPr/>
+          </p:nvGrpSpPr>
+          <p:grpSpPr>
+            <a:xfrm>
+              <a:off x="7455837" y="2063674"/>
+              <a:ext cx="3967944" cy="1197035"/>
+              <a:chOff x="0" y="0"/>
+              <a:chExt cx="3967943" cy="1197034"/>
+            </a:xfrm>
+          </p:grpSpPr>
+          <p:grpSp>
+            <p:nvGrpSpPr>
+              <p:cNvPr id="31" name="Ovale 8">
+                <a:extLst>
+                  <a:ext uri="{FF2B5EF4-FFF2-40B4-BE49-F238E27FC236}">
+                    <a16:creationId xmlns:a16="http://schemas.microsoft.com/office/drawing/2014/main" id="{AB3B1D8A-943A-4983-B7B7-512CE410737C}"/>
+                  </a:ext>
+                </a:extLst>
+              </p:cNvPr>
+              <p:cNvGrpSpPr/>
+              <p:nvPr/>
+            </p:nvGrpSpPr>
+            <p:grpSpPr>
+              <a:xfrm>
+                <a:off x="0" y="-1"/>
+                <a:ext cx="1197035" cy="1197035"/>
+                <a:chOff x="0" y="0"/>
+                <a:chExt cx="1197033" cy="1197034"/>
+              </a:xfrm>
+            </p:grpSpPr>
+            <p:sp>
+              <p:nvSpPr>
+                <p:cNvPr id="36" name="Cerchio">
+                  <a:extLst>
+                    <a:ext uri="{FF2B5EF4-FFF2-40B4-BE49-F238E27FC236}">
+                      <a16:creationId xmlns:a16="http://schemas.microsoft.com/office/drawing/2014/main" id="{B052208A-1255-48B2-8E0A-B94069D4DFE7}"/>
+                    </a:ext>
+                  </a:extLst>
+                </p:cNvPr>
+                <p:cNvSpPr/>
+                <p:nvPr/>
+              </p:nvSpPr>
+              <p:spPr>
+                <a:xfrm>
+                  <a:off x="0" y="0"/>
+                  <a:ext cx="1197034" cy="1197035"/>
+                </a:xfrm>
+                <a:prstGeom prst="ellipse">
+                  <a:avLst/>
+                </a:prstGeom>
+                <a:blipFill rotWithShape="1">
+                  <a:blip r:embed="rId7"/>
+                  <a:srcRect/>
+                  <a:stretch>
+                    <a:fillRect/>
+                  </a:stretch>
+                </a:blipFill>
+                <a:ln w="47625" cap="flat">
+                  <a:solidFill>
+                    <a:srgbClr val="000000"/>
+                  </a:solidFill>
+                  <a:prstDash val="solid"/>
+                  <a:round/>
+                </a:ln>
+                <a:effectLst/>
+              </p:spPr>
+              <p:txBody>
+                <a:bodyPr wrap="square" lIns="45718" tIns="45718" rIns="45718" bIns="45718" numCol="1" anchor="t">
+                  <a:noAutofit/>
+                </a:bodyPr>
+                <a:lstStyle/>
+                <a:p>
+                  <a:endParaRPr/>
+                </a:p>
+              </p:txBody>
+            </p:sp>
+            <p:sp>
+              <p:nvSpPr>
+                <p:cNvPr id="37" name="Testo">
+                  <a:extLst>
+                    <a:ext uri="{FF2B5EF4-FFF2-40B4-BE49-F238E27FC236}">
+                      <a16:creationId xmlns:a16="http://schemas.microsoft.com/office/drawing/2014/main" id="{B295EC3B-4733-41DC-B0D7-3CE162AF7700}"/>
+                    </a:ext>
+                  </a:extLst>
+                </p:cNvPr>
+                <p:cNvSpPr txBox="1"/>
+                <p:nvPr/>
+              </p:nvSpPr>
+              <p:spPr>
+                <a:xfrm>
+                  <a:off x="175300" y="175300"/>
+                  <a:ext cx="846434" cy="358139"/>
+                </a:xfrm>
+                <a:prstGeom prst="rect">
+                  <a:avLst/>
+                </a:prstGeom>
+                <a:noFill/>
+                <a:ln w="12700" cap="flat">
+                  <a:noFill/>
+                  <a:miter lim="400000"/>
+                </a:ln>
+                <a:effectLst/>
+                <a:extLst>
+                  <a:ext uri="{C572A759-6A51-4108-AA02-DFA0A04FC94B}">
+                    <ma14:wrappingTextBoxFlag xmlns:ma14="http://schemas.microsoft.com/office/mac/drawingml/2011/main" xmlns="" val="1"/>
+                  </a:ext>
+                </a:extLst>
+              </p:spPr>
+              <p:txBody>
+                <a:bodyPr wrap="square" lIns="45718" tIns="45718" rIns="45718" bIns="45718" numCol="1" anchor="t">
+                  <a:spAutoFit/>
+                </a:bodyPr>
+                <a:lstStyle/>
+                <a:p>
+                  <a:r>
+                    <a:t> </a:t>
+                  </a:r>
+                </a:p>
+              </p:txBody>
+            </p:sp>
+          </p:grpSp>
+          <p:grpSp>
+            <p:nvGrpSpPr>
+              <p:cNvPr id="32" name="Ovale 11">
+                <a:extLst>
+                  <a:ext uri="{FF2B5EF4-FFF2-40B4-BE49-F238E27FC236}">
+                    <a16:creationId xmlns:a16="http://schemas.microsoft.com/office/drawing/2014/main" id="{17D22BD5-1717-4D21-BE63-A74CEB709137}"/>
+                  </a:ext>
+                </a:extLst>
+              </p:cNvPr>
+              <p:cNvGrpSpPr/>
+              <p:nvPr/>
+            </p:nvGrpSpPr>
+            <p:grpSpPr>
+              <a:xfrm>
+                <a:off x="2770909" y="-1"/>
+                <a:ext cx="1197035" cy="1197035"/>
+                <a:chOff x="0" y="0"/>
+                <a:chExt cx="1197033" cy="1197034"/>
+              </a:xfrm>
+            </p:grpSpPr>
+            <p:sp>
+              <p:nvSpPr>
+                <p:cNvPr id="34" name="Cerchio">
+                  <a:extLst>
+                    <a:ext uri="{FF2B5EF4-FFF2-40B4-BE49-F238E27FC236}">
+                      <a16:creationId xmlns:a16="http://schemas.microsoft.com/office/drawing/2014/main" id="{FE6D36C5-EA67-41A1-A88B-63F7E65D696F}"/>
+                    </a:ext>
+                  </a:extLst>
+                </p:cNvPr>
+                <p:cNvSpPr/>
+                <p:nvPr/>
+              </p:nvSpPr>
+              <p:spPr>
+                <a:xfrm>
+                  <a:off x="0" y="0"/>
+                  <a:ext cx="1197034" cy="1197035"/>
+                </a:xfrm>
+                <a:prstGeom prst="ellipse">
+                  <a:avLst/>
+                </a:prstGeom>
+                <a:blipFill rotWithShape="1">
+                  <a:blip r:embed="rId8"/>
+                  <a:srcRect/>
+                  <a:stretch>
+                    <a:fillRect/>
+                  </a:stretch>
+                </a:blipFill>
+                <a:ln w="47625" cap="flat">
+                  <a:solidFill>
+                    <a:srgbClr val="000000"/>
+                  </a:solidFill>
+                  <a:prstDash val="solid"/>
+                  <a:round/>
+                </a:ln>
+                <a:effectLst/>
+              </p:spPr>
+              <p:txBody>
+                <a:bodyPr wrap="square" lIns="45718" tIns="45718" rIns="45718" bIns="45718" numCol="1" anchor="t">
+                  <a:noAutofit/>
+                </a:bodyPr>
+                <a:lstStyle/>
+                <a:p>
+                  <a:endParaRPr/>
+                </a:p>
+              </p:txBody>
+            </p:sp>
+            <p:sp>
+              <p:nvSpPr>
+                <p:cNvPr id="35" name="Testo">
+                  <a:extLst>
+                    <a:ext uri="{FF2B5EF4-FFF2-40B4-BE49-F238E27FC236}">
+                      <a16:creationId xmlns:a16="http://schemas.microsoft.com/office/drawing/2014/main" id="{61BDB688-7A0E-4CD9-A51A-9506C4B23D7A}"/>
+                    </a:ext>
+                  </a:extLst>
+                </p:cNvPr>
+                <p:cNvSpPr txBox="1"/>
+                <p:nvPr/>
+              </p:nvSpPr>
+              <p:spPr>
+                <a:xfrm>
+                  <a:off x="175300" y="175300"/>
+                  <a:ext cx="846434" cy="358139"/>
+                </a:xfrm>
+                <a:prstGeom prst="rect">
+                  <a:avLst/>
+                </a:prstGeom>
+                <a:noFill/>
+                <a:ln w="12700" cap="flat">
+                  <a:noFill/>
+                  <a:miter lim="400000"/>
+                </a:ln>
+                <a:effectLst/>
+                <a:extLst>
+                  <a:ext uri="{C572A759-6A51-4108-AA02-DFA0A04FC94B}">
+                    <ma14:wrappingTextBoxFlag xmlns:ma14="http://schemas.microsoft.com/office/mac/drawingml/2011/main" xmlns="" val="1"/>
+                  </a:ext>
+                </a:extLst>
+              </p:spPr>
+              <p:txBody>
+                <a:bodyPr wrap="square" lIns="45718" tIns="45718" rIns="45718" bIns="45718" numCol="1" anchor="t">
+                  <a:spAutoFit/>
+                </a:bodyPr>
+                <a:lstStyle/>
+                <a:p>
+                  <a:r>
+                    <a:t> </a:t>
+                  </a:r>
+                </a:p>
+              </p:txBody>
+            </p:sp>
+          </p:grpSp>
+          <p:sp>
+            <p:nvSpPr>
+              <p:cNvPr id="33" name="Connettore diritto 14">
+                <a:extLst>
+                  <a:ext uri="{FF2B5EF4-FFF2-40B4-BE49-F238E27FC236}">
+                    <a16:creationId xmlns:a16="http://schemas.microsoft.com/office/drawing/2014/main" id="{010679E6-5667-4D04-830F-C1CCC1BD5A52}"/>
+                  </a:ext>
+                </a:extLst>
+              </p:cNvPr>
+              <p:cNvSpPr/>
+              <p:nvPr/>
+            </p:nvSpPr>
+            <p:spPr>
+              <a:xfrm>
+                <a:off x="1197032" y="598515"/>
+                <a:ext cx="1573879" cy="2"/>
+              </a:xfrm>
+              <a:prstGeom prst="line">
+                <a:avLst/>
+              </a:prstGeom>
+              <a:noFill/>
+              <a:ln w="47625" cap="flat">
+                <a:solidFill>
+                  <a:srgbClr val="000000"/>
+                </a:solidFill>
+                <a:prstDash val="solid"/>
+                <a:miter lim="800000"/>
+              </a:ln>
+              <a:effectLst/>
+            </p:spPr>
+            <p:txBody>
+              <a:bodyPr wrap="square" lIns="45718" tIns="45718" rIns="45718" bIns="45718" numCol="1" anchor="t">
+                <a:noAutofit/>
+              </a:bodyPr>
+              <a:lstStyle/>
+              <a:p>
+                <a:endParaRPr/>
+              </a:p>
+            </p:txBody>
+          </p:sp>
+        </p:grpSp>
+        <p:grpSp>
+          <p:nvGrpSpPr>
+            <p:cNvPr id="38" name="CasellaDiTesto 18">
+              <a:extLst>
+                <a:ext uri="{FF2B5EF4-FFF2-40B4-BE49-F238E27FC236}">
+                  <a16:creationId xmlns:a16="http://schemas.microsoft.com/office/drawing/2014/main" id="{DAD2C405-5852-45F3-989F-711823ADB7CC}"/>
+                </a:ext>
+              </a:extLst>
+            </p:cNvPr>
+            <p:cNvGrpSpPr/>
+            <p:nvPr/>
+          </p:nvGrpSpPr>
+          <p:grpSpPr>
+            <a:xfrm>
+              <a:off x="8781600" y="1736961"/>
+              <a:ext cx="1309401" cy="738668"/>
+              <a:chOff x="-1" y="0"/>
+              <a:chExt cx="1309400" cy="738666"/>
+            </a:xfrm>
+          </p:grpSpPr>
+          <p:sp>
+            <p:nvSpPr>
+              <p:cNvPr id="39" name="Rettangolo">
+                <a:extLst>
+                  <a:ext uri="{FF2B5EF4-FFF2-40B4-BE49-F238E27FC236}">
+                    <a16:creationId xmlns:a16="http://schemas.microsoft.com/office/drawing/2014/main" id="{DA3ECE19-ADC8-4B65-9F8A-0F859E0DEAB0}"/>
+                  </a:ext>
+                </a:extLst>
+              </p:cNvPr>
+              <p:cNvSpPr/>
+              <p:nvPr/>
+            </p:nvSpPr>
+            <p:spPr>
+              <a:xfrm>
+                <a:off x="-2" y="-1"/>
+                <a:ext cx="1309401" cy="738667"/>
+              </a:xfrm>
+              <a:prstGeom prst="rect">
+                <a:avLst/>
+              </a:prstGeom>
+              <a:blipFill rotWithShape="1">
+                <a:blip r:embed="rId9"/>
+                <a:srcRect/>
+                <a:stretch>
+                  <a:fillRect/>
+                </a:stretch>
+              </a:blipFill>
+              <a:ln w="12700" cap="flat">
+                <a:noFill/>
+                <a:miter lim="400000"/>
+              </a:ln>
+              <a:effectLst/>
+            </p:spPr>
+            <p:txBody>
+              <a:bodyPr wrap="square" lIns="45718" tIns="45718" rIns="45718" bIns="45718" numCol="1" anchor="t">
+                <a:noAutofit/>
+              </a:bodyPr>
+              <a:lstStyle/>
+              <a:p>
+                <a:endParaRPr/>
+              </a:p>
+            </p:txBody>
+          </p:sp>
+          <p:sp>
+            <p:nvSpPr>
+              <p:cNvPr id="40" name="Testo">
+                <a:extLst>
+                  <a:ext uri="{FF2B5EF4-FFF2-40B4-BE49-F238E27FC236}">
+                    <a16:creationId xmlns:a16="http://schemas.microsoft.com/office/drawing/2014/main" id="{A6F940BB-8F7D-492A-9236-FBC0D99E9B2C}"/>
+                  </a:ext>
+                </a:extLst>
+              </p:cNvPr>
+              <p:cNvSpPr txBox="1"/>
+              <p:nvPr/>
+            </p:nvSpPr>
+            <p:spPr>
+              <a:xfrm>
+                <a:off x="-2" y="-1"/>
+                <a:ext cx="1309401" cy="358139"/>
+              </a:xfrm>
+              <a:prstGeom prst="rect">
+                <a:avLst/>
+              </a:prstGeom>
+              <a:noFill/>
+              <a:ln w="12700" cap="flat">
+                <a:noFill/>
+                <a:miter lim="400000"/>
+              </a:ln>
+              <a:effectLst/>
+              <a:extLst>
+                <a:ext uri="{C572A759-6A51-4108-AA02-DFA0A04FC94B}">
+                  <ma14:wrappingTextBoxFlag xmlns:ma14="http://schemas.microsoft.com/office/mac/drawingml/2011/main" xmlns="" val="1"/>
+                </a:ext>
+              </a:extLst>
+            </p:spPr>
+            <p:txBody>
+              <a:bodyPr wrap="square" lIns="45718" tIns="45718" rIns="45718" bIns="45718" numCol="1" anchor="t">
+                <a:spAutoFit/>
+              </a:bodyPr>
+              <a:lstStyle/>
+              <a:p>
+                <a:r>
+                  <a:t> </a:t>
+                </a:r>
+              </a:p>
+            </p:txBody>
+          </p:sp>
+        </p:grpSp>
+        <p:sp>
+          <p:nvSpPr>
+            <p:cNvPr id="41" name="Connettore 2 16">
+              <a:extLst>
+                <a:ext uri="{FF2B5EF4-FFF2-40B4-BE49-F238E27FC236}">
+                  <a16:creationId xmlns:a16="http://schemas.microsoft.com/office/drawing/2014/main" id="{BE73C4CE-18B1-475B-A77B-A8BB9AA6D80D}"/>
+                </a:ext>
+              </a:extLst>
+            </p:cNvPr>
+            <p:cNvSpPr/>
+            <p:nvPr/>
+          </p:nvSpPr>
+          <p:spPr>
+            <a:xfrm>
+              <a:off x="7132318" y="2271491"/>
+              <a:ext cx="2" cy="781398"/>
+            </a:xfrm>
+            <a:prstGeom prst="line">
+              <a:avLst/>
+            </a:prstGeom>
+            <a:ln w="76200">
+              <a:solidFill>
+                <a:srgbClr val="C00000"/>
+              </a:solidFill>
+              <a:miter/>
+              <a:headEnd type="triangle"/>
+              <a:tailEnd type="triangle"/>
+            </a:ln>
+          </p:spPr>
+          <p:txBody>
+            <a:bodyPr lIns="45718" tIns="45718" rIns="45718" bIns="45718"/>
+            <a:lstStyle/>
+            <a:p>
+              <a:endParaRPr/>
+            </a:p>
+          </p:txBody>
+        </p:sp>
+      </p:grpSp>
+      <p:grpSp>
+        <p:nvGrpSpPr>
+          <p:cNvPr id="42" name="Gruppo 32">
+            <a:extLst>
+              <a:ext uri="{FF2B5EF4-FFF2-40B4-BE49-F238E27FC236}">
+                <a16:creationId xmlns:a16="http://schemas.microsoft.com/office/drawing/2014/main" id="{0C756654-8729-4FF5-8DCE-18F8B351061E}"/>
+              </a:ext>
+            </a:extLst>
+          </p:cNvPr>
+          <p:cNvGrpSpPr/>
+          <p:nvPr/>
+        </p:nvGrpSpPr>
+        <p:grpSpPr>
+          <a:xfrm>
+            <a:off x="904884" y="924215"/>
+            <a:ext cx="2746839" cy="2524528"/>
+            <a:chOff x="0" y="0"/>
+            <a:chExt cx="3293154" cy="3293154"/>
+          </a:xfrm>
+        </p:grpSpPr>
+        <p:pic>
+          <p:nvPicPr>
+            <p:cNvPr id="43" name="Immagine 23" descr="Immagine 23">
+              <a:extLst>
+                <a:ext uri="{FF2B5EF4-FFF2-40B4-BE49-F238E27FC236}">
+                  <a16:creationId xmlns:a16="http://schemas.microsoft.com/office/drawing/2014/main" id="{0DF6CFBA-DB18-4800-9641-64D4A0C62EA0}"/>
+                </a:ext>
+              </a:extLst>
+            </p:cNvPr>
+            <p:cNvPicPr>
+              <a:picLocks noChangeAspect="1"/>
+            </p:cNvPicPr>
+            <p:nvPr/>
+          </p:nvPicPr>
+          <p:blipFill>
+            <a:blip r:embed="rId10">
+              <a:extLst/>
+            </a:blip>
+            <a:stretch>
+              <a:fillRect/>
+            </a:stretch>
+          </p:blipFill>
+          <p:spPr>
+            <a:xfrm>
+              <a:off x="-1" y="-1"/>
+              <a:ext cx="3293155" cy="3293155"/>
+            </a:xfrm>
+            <a:prstGeom prst="rect">
+              <a:avLst/>
+            </a:prstGeom>
+            <a:ln w="12700" cap="flat">
+              <a:noFill/>
+              <a:miter lim="400000"/>
+            </a:ln>
+            <a:effectLst/>
+          </p:spPr>
+        </p:pic>
+        <p:sp>
+          <p:nvSpPr>
+            <p:cNvPr id="44" name="Ovale 31">
+              <a:extLst>
+                <a:ext uri="{FF2B5EF4-FFF2-40B4-BE49-F238E27FC236}">
+                  <a16:creationId xmlns:a16="http://schemas.microsoft.com/office/drawing/2014/main" id="{E568960A-C135-412E-9B46-03B62AD4F980}"/>
+                </a:ext>
+              </a:extLst>
+            </p:cNvPr>
+            <p:cNvSpPr/>
+            <p:nvPr/>
+          </p:nvSpPr>
+          <p:spPr>
+            <a:xfrm>
+              <a:off x="716122" y="371917"/>
+              <a:ext cx="1047735" cy="554901"/>
+            </a:xfrm>
+            <a:prstGeom prst="ellipse">
+              <a:avLst/>
+            </a:prstGeom>
+            <a:noFill/>
+            <a:ln w="76200" cap="flat">
+              <a:solidFill>
+                <a:srgbClr val="C00000"/>
+              </a:solidFill>
+              <a:prstDash val="solid"/>
+              <a:miter lim="800000"/>
+            </a:ln>
+            <a:effectLst/>
+          </p:spPr>
+          <p:txBody>
+            <a:bodyPr wrap="square" lIns="45718" tIns="45718" rIns="45718" bIns="45718" numCol="1" anchor="ctr">
+              <a:noAutofit/>
+            </a:bodyPr>
+            <a:lstStyle/>
+            <a:p>
+              <a:pPr algn="ctr">
+                <a:defRPr>
+                  <a:solidFill>
+                    <a:srgbClr val="FFFFFF"/>
+                  </a:solidFill>
+                </a:defRPr>
+              </a:pPr>
+              <a:endParaRPr/>
+            </a:p>
+          </p:txBody>
+        </p:sp>
+      </p:grpSp>
     </p:spTree>
     <p:extLst>
       <p:ext uri="{BB962C8B-B14F-4D97-AF65-F5344CB8AC3E}">
@@ -9510,8 +10291,44 @@
         </p:blipFill>
         <p:spPr>
           <a:xfrm>
-            <a:off x="2143319" y="1009477"/>
+            <a:off x="4292080" y="897750"/>
             <a:ext cx="7467600" cy="5286375"/>
+          </a:xfrm>
+          <a:prstGeom prst="rect">
+            <a:avLst/>
+          </a:prstGeom>
+        </p:spPr>
+      </p:pic>
+      <p:pic>
+        <p:nvPicPr>
+          <p:cNvPr id="11" name="Immagine 10" descr="Immagine che contiene testo, mappa&#10;&#10;Descrizione generata con affidabilità molto elevata">
+            <a:extLst>
+              <a:ext uri="{FF2B5EF4-FFF2-40B4-BE49-F238E27FC236}">
+                <a16:creationId xmlns:a16="http://schemas.microsoft.com/office/drawing/2014/main" id="{0AAA8F57-5A9C-4341-BCD0-C67AA2E328A0}"/>
+              </a:ext>
+            </a:extLst>
+          </p:cNvPr>
+          <p:cNvPicPr>
+            <a:picLocks noChangeAspect="1"/>
+          </p:cNvPicPr>
+          <p:nvPr/>
+        </p:nvPicPr>
+        <p:blipFill>
+          <a:blip r:embed="rId3" cstate="print">
+            <a:extLst>
+              <a:ext uri="{28A0092B-C50C-407E-A947-70E740481C1C}">
+                <a14:useLocalDpi xmlns:a14="http://schemas.microsoft.com/office/drawing/2010/main" val="0"/>
+              </a:ext>
+            </a:extLst>
+          </a:blip>
+          <a:stretch>
+            <a:fillRect/>
+          </a:stretch>
+        </p:blipFill>
+        <p:spPr>
+          <a:xfrm>
+            <a:off x="637736" y="3429000"/>
+            <a:ext cx="3005195" cy="2440115"/>
           </a:xfrm>
           <a:prstGeom prst="rect">
             <a:avLst/>

</xml_diff>